<commit_message>
add tasks- 04 and 05 topics
</commit_message>
<xml_diff>
--- a/05-VueFundamentals/VueFundamentals.pptx
+++ b/05-VueFundamentals/VueFundamentals.pptx
@@ -225,7 +225,7 @@
           <a:p>
             <a:fld id="{C106EF3D-C2A7-4690-80C8-C2473A856193}" type="datetimeFigureOut">
               <a:rPr lang="pl-PL" smtClean="0"/>
-              <a:t>2020-02-21</a:t>
+              <a:t>01.04.2020</a:t>
             </a:fld>
             <a:endParaRPr lang="pl-PL" dirty="0"/>
           </a:p>
@@ -390,7 +390,7 @@
           <a:p>
             <a:fld id="{85D68E81-03CD-43A1-B18B-BEB6B9439387}" type="datetimeFigureOut">
               <a:rPr lang="pl-PL" smtClean="0"/>
-              <a:t>2020-02-21</a:t>
+              <a:t>01.04.2020</a:t>
             </a:fld>
             <a:endParaRPr lang="pl-PL" dirty="0"/>
           </a:p>
@@ -786,7 +786,7 @@
           <a:p>
             <a:fld id="{F26B3061-B9B7-461F-AB67-5D66A3ABCDA5}" type="datetime1">
               <a:rPr lang="pl-PL" smtClean="0"/>
-              <a:t>2020-02-21</a:t>
+              <a:t>01.04.2020</a:t>
             </a:fld>
             <a:endParaRPr lang="pl-PL" dirty="0"/>
           </a:p>
@@ -1061,7 +1061,7 @@
           <a:p>
             <a:fld id="{A2ADAE54-1728-4B6D-BEF4-D2AEA4F8114E}" type="datetime1">
               <a:rPr lang="pl-PL" smtClean="0"/>
-              <a:t>2020-02-21</a:t>
+              <a:t>01.04.2020</a:t>
             </a:fld>
             <a:endParaRPr lang="pl-PL" dirty="0"/>
           </a:p>
@@ -1313,7 +1313,7 @@
           <a:p>
             <a:fld id="{919C3B4F-179D-44ED-90DF-E8739DC8608F}" type="datetime1">
               <a:rPr lang="pl-PL" smtClean="0"/>
-              <a:t>2020-02-21</a:t>
+              <a:t>01.04.2020</a:t>
             </a:fld>
             <a:endParaRPr lang="pl-PL" dirty="0"/>
           </a:p>
@@ -1481,7 +1481,7 @@
           <a:p>
             <a:fld id="{10A2297D-8C4B-4C5B-B66E-47E601842B03}" type="datetime1">
               <a:rPr lang="pl-PL" smtClean="0"/>
-              <a:t>2020-02-21</a:t>
+              <a:t>01.04.2020</a:t>
             </a:fld>
             <a:endParaRPr lang="pl-PL" dirty="0"/>
           </a:p>
@@ -1659,7 +1659,7 @@
           <a:p>
             <a:fld id="{94B42B50-113C-45E3-9231-B66C297B394E}" type="datetime1">
               <a:rPr lang="pl-PL" smtClean="0"/>
-              <a:t>2020-02-21</a:t>
+              <a:t>01.04.2020</a:t>
             </a:fld>
             <a:endParaRPr lang="pl-PL" dirty="0"/>
           </a:p>
@@ -1816,7 +1816,7 @@
           <a:p>
             <a:fld id="{9549FAE5-AB97-492F-ADAE-06E72624D9F3}" type="datetime1">
               <a:rPr lang="pl-PL" smtClean="0"/>
-              <a:t>2020-02-21</a:t>
+              <a:t>01.04.2020</a:t>
             </a:fld>
             <a:endParaRPr lang="pl-PL" dirty="0"/>
           </a:p>
@@ -2004,7 +2004,7 @@
           <a:p>
             <a:fld id="{9549FAE5-AB97-492F-ADAE-06E72624D9F3}" type="datetime1">
               <a:rPr lang="pl-PL" smtClean="0"/>
-              <a:t>2020-02-21</a:t>
+              <a:t>01.04.2020</a:t>
             </a:fld>
             <a:endParaRPr lang="pl-PL" dirty="0"/>
           </a:p>
@@ -2191,7 +2191,7 @@
           <a:p>
             <a:fld id="{9549FAE5-AB97-492F-ADAE-06E72624D9F3}" type="datetime1">
               <a:rPr lang="pl-PL" smtClean="0"/>
-              <a:t>2020-02-21</a:t>
+              <a:t>01.04.2020</a:t>
             </a:fld>
             <a:endParaRPr lang="pl-PL" dirty="0"/>
           </a:p>
@@ -2463,7 +2463,7 @@
           <a:p>
             <a:fld id="{ED0EDA0A-F020-4B01-AF63-E290248EFD6B}" type="datetime1">
               <a:rPr lang="pl-PL" smtClean="0"/>
-              <a:t>2020-02-21</a:t>
+              <a:t>01.04.2020</a:t>
             </a:fld>
             <a:endParaRPr lang="pl-PL" dirty="0"/>
           </a:p>
@@ -2719,7 +2719,7 @@
           <a:p>
             <a:fld id="{8B752FBA-2CC8-4F32-B36A-B6E16B4A5C14}" type="datetime1">
               <a:rPr lang="pl-PL" smtClean="0"/>
-              <a:t>2020-02-21</a:t>
+              <a:t>01.04.2020</a:t>
             </a:fld>
             <a:endParaRPr lang="pl-PL" dirty="0"/>
           </a:p>
@@ -3105,7 +3105,7 @@
           <a:p>
             <a:fld id="{3B7BA32A-B79B-42FE-906A-2593AD6A7FCC}" type="datetime1">
               <a:rPr lang="pl-PL" smtClean="0"/>
-              <a:t>2020-02-21</a:t>
+              <a:t>01.04.2020</a:t>
             </a:fld>
             <a:endParaRPr lang="pl-PL" dirty="0"/>
           </a:p>
@@ -3227,7 +3227,7 @@
           <a:p>
             <a:fld id="{3E28EDCB-CC2B-4C70-B921-DD5382BD4849}" type="datetime1">
               <a:rPr lang="pl-PL" smtClean="0"/>
-              <a:t>2020-02-21</a:t>
+              <a:t>01.04.2020</a:t>
             </a:fld>
             <a:endParaRPr lang="pl-PL" dirty="0"/>
           </a:p>
@@ -3322,7 +3322,7 @@
           <a:p>
             <a:fld id="{E960CF9B-2F8C-4614-93FE-75BD5748BF99}" type="datetime1">
               <a:rPr lang="pl-PL" smtClean="0"/>
-              <a:t>2020-02-21</a:t>
+              <a:t>01.04.2020</a:t>
             </a:fld>
             <a:endParaRPr lang="pl-PL" dirty="0"/>
           </a:p>
@@ -3538,7 +3538,7 @@
           <a:p>
             <a:fld id="{8F276EAB-4011-4C81-ACEC-B79731A9A244}" type="datetime1">
               <a:rPr lang="pl-PL" smtClean="0"/>
-              <a:t>2020-02-21</a:t>
+              <a:t>01.04.2020</a:t>
             </a:fld>
             <a:endParaRPr lang="pl-PL" dirty="0"/>
           </a:p>
@@ -6268,6 +6268,13 @@
               </a:rPr>
               <a:t>&gt;</a:t>
             </a:r>
+            <a:r>
+              <a:rPr lang="pl-PL" sz="2000" b="0" dirty="0">
+                <a:latin typeface="Courier New" panose="02070309020205020404" pitchFamily="49" charset="0"/>
+                <a:cs typeface="Courier New" panose="02070309020205020404" pitchFamily="49" charset="0"/>
+              </a:rPr>
+              <a:t/>
+            </a:r>
             <a:br>
               <a:rPr lang="pl-PL" sz="2000" b="0" dirty="0">
                 <a:latin typeface="Courier New" panose="02070309020205020404" pitchFamily="49" charset="0"/>
@@ -6298,6 +6305,13 @@
               </a:rPr>
               <a:t>"&gt;</a:t>
             </a:r>
+            <a:r>
+              <a:rPr lang="pl-PL" sz="2000" b="0" dirty="0">
+                <a:latin typeface="Courier New" panose="02070309020205020404" pitchFamily="49" charset="0"/>
+                <a:cs typeface="Courier New" panose="02070309020205020404" pitchFamily="49" charset="0"/>
+              </a:rPr>
+              <a:t/>
+            </a:r>
             <a:br>
               <a:rPr lang="pl-PL" sz="2000" b="0" dirty="0">
                 <a:latin typeface="Courier New" panose="02070309020205020404" pitchFamily="49" charset="0"/>
@@ -6327,6 +6341,13 @@
                 <a:cs typeface="Courier New" panose="02070309020205020404" pitchFamily="49" charset="0"/>
               </a:rPr>
               <a:t> }}</a:t>
+            </a:r>
+            <a:r>
+              <a:rPr lang="pl-PL" sz="2000" b="0" dirty="0">
+                <a:latin typeface="Courier New" panose="02070309020205020404" pitchFamily="49" charset="0"/>
+                <a:cs typeface="Courier New" panose="02070309020205020404" pitchFamily="49" charset="0"/>
+              </a:rPr>
+              <a:t/>
             </a:r>
             <a:br>
               <a:rPr lang="pl-PL" sz="2000" b="0" dirty="0">
@@ -6633,6 +6654,13 @@
                 <a:cs typeface="Courier New" panose="02070309020205020404" pitchFamily="49" charset="0"/>
               </a:rPr>
               <a:t>this.university</a:t>
+            </a:r>
+            <a:r>
+              <a:rPr lang="pl-PL" sz="2000" b="0" dirty="0">
+                <a:latin typeface="Courier New" panose="02070309020205020404" pitchFamily="49" charset="0"/>
+                <a:cs typeface="Courier New" panose="02070309020205020404" pitchFamily="49" charset="0"/>
+              </a:rPr>
+              <a:t/>
             </a:r>
             <a:br>
               <a:rPr lang="pl-PL" sz="2000" b="0" dirty="0">
@@ -6882,6 +6910,13 @@
               </a:rPr>
               <a:t>&gt;</a:t>
             </a:r>
+            <a:r>
+              <a:rPr lang="pl-PL" sz="2000" b="0" dirty="0">
+                <a:latin typeface="Courier New" panose="02070309020205020404" pitchFamily="49" charset="0"/>
+                <a:cs typeface="Courier New" panose="02070309020205020404" pitchFamily="49" charset="0"/>
+              </a:rPr>
+              <a:t/>
+            </a:r>
             <a:br>
               <a:rPr lang="pl-PL" sz="2000" b="0" dirty="0">
                 <a:latin typeface="Courier New" panose="02070309020205020404" pitchFamily="49" charset="0"/>
@@ -6912,6 +6947,13 @@
               </a:rPr>
               <a:t>"&gt;</a:t>
             </a:r>
+            <a:r>
+              <a:rPr lang="pl-PL" sz="2000" b="0" dirty="0">
+                <a:latin typeface="Courier New" panose="02070309020205020404" pitchFamily="49" charset="0"/>
+                <a:cs typeface="Courier New" panose="02070309020205020404" pitchFamily="49" charset="0"/>
+              </a:rPr>
+              <a:t/>
+            </a:r>
             <a:br>
               <a:rPr lang="pl-PL" sz="2000" b="0" dirty="0">
                 <a:latin typeface="Courier New" panose="02070309020205020404" pitchFamily="49" charset="0"/>
@@ -6951,6 +6993,13 @@
                 <a:cs typeface="Courier New" panose="02070309020205020404" pitchFamily="49" charset="0"/>
               </a:rPr>
               <a:t> }}</a:t>
+            </a:r>
+            <a:r>
+              <a:rPr lang="pl-PL" sz="2000" b="0" dirty="0">
+                <a:latin typeface="Courier New" panose="02070309020205020404" pitchFamily="49" charset="0"/>
+                <a:cs typeface="Courier New" panose="02070309020205020404" pitchFamily="49" charset="0"/>
+              </a:rPr>
+              <a:t/>
             </a:r>
             <a:br>
               <a:rPr lang="pl-PL" sz="2000" b="0" dirty="0">
@@ -7257,6 +7306,13 @@
                 <a:cs typeface="Courier New" panose="02070309020205020404" pitchFamily="49" charset="0"/>
               </a:rPr>
               <a:t>this.university</a:t>
+            </a:r>
+            <a:r>
+              <a:rPr lang="pl-PL" sz="2000" b="0" dirty="0">
+                <a:latin typeface="Courier New" panose="02070309020205020404" pitchFamily="49" charset="0"/>
+                <a:cs typeface="Courier New" panose="02070309020205020404" pitchFamily="49" charset="0"/>
+              </a:rPr>
+              <a:t/>
             </a:r>
             <a:br>
               <a:rPr lang="pl-PL" sz="2000" b="0" dirty="0">
@@ -7696,6 +7752,13 @@
             </a:r>
           </a:p>
           <a:p>
+            <a:r>
+              <a:rPr lang="pl-PL" b="0" dirty="0">
+                <a:latin typeface="Courier New" panose="02070309020205020404" pitchFamily="49" charset="0"/>
+                <a:cs typeface="Courier New" panose="02070309020205020404" pitchFamily="49" charset="0"/>
+              </a:rPr>
+              <a:t/>
+            </a:r>
             <a:br>
               <a:rPr lang="pl-PL" b="0" dirty="0">
                 <a:latin typeface="Courier New" panose="02070309020205020404" pitchFamily="49" charset="0"/>
@@ -7741,6 +7804,13 @@
                 <a:cs typeface="Courier New" panose="02070309020205020404" pitchFamily="49" charset="0"/>
               </a:rPr>
               <a:t>book</a:t>
+            </a:r>
+            <a:r>
+              <a:rPr lang="pl-PL" b="0" dirty="0">
+                <a:latin typeface="Courier New" panose="02070309020205020404" pitchFamily="49" charset="0"/>
+                <a:cs typeface="Courier New" panose="02070309020205020404" pitchFamily="49" charset="0"/>
+              </a:rPr>
+              <a:t/>
             </a:r>
             <a:br>
               <a:rPr lang="pl-PL" b="0" dirty="0">
@@ -8093,6 +8163,10 @@
           <a:lstStyle/>
           <a:p>
             <a:pPr algn="ctr"/>
+            <a:r>
+              <a:rPr lang="pl-PL" sz="2400" b="1" dirty="0"/>
+              <a:t/>
+            </a:r>
             <a:br>
               <a:rPr lang="pl-PL" sz="2400" b="1" dirty="0"/>
             </a:br>
@@ -8100,6 +8174,10 @@
               <a:rPr lang="pl-PL" sz="2400" b="1" dirty="0"/>
               <a:t>UNIKPOL S.A.</a:t>
             </a:r>
+            <a:r>
+              <a:rPr lang="pl-PL" sz="2400" dirty="0"/>
+              <a:t/>
+            </a:r>
             <a:br>
               <a:rPr lang="pl-PL" sz="2400" dirty="0"/>
             </a:br>
@@ -8129,6 +8207,10 @@
                 <a:hlinkClick r:id="rId2"/>
               </a:rPr>
               <a:t>http://www.unikpol.pl</a:t>
+            </a:r>
+            <a:r>
+              <a:rPr lang="pl-PL" sz="2400" dirty="0"/>
+              <a:t/>
             </a:r>
             <a:br>
               <a:rPr lang="pl-PL" sz="2400" dirty="0"/>
@@ -8342,6 +8424,13 @@
               </a:rPr>
               <a:t>EMPLOYEE RECORD</a:t>
             </a:r>
+            <a:r>
+              <a:rPr lang="pl-PL" b="0" dirty="0">
+                <a:latin typeface="Courier New" panose="02070309020205020404" pitchFamily="49" charset="0"/>
+                <a:cs typeface="Courier New" panose="02070309020205020404" pitchFamily="49" charset="0"/>
+              </a:rPr>
+              <a:t/>
+            </a:r>
             <a:br>
               <a:rPr lang="pl-PL" b="0" dirty="0">
                 <a:latin typeface="Courier New" panose="02070309020205020404" pitchFamily="49" charset="0"/>
@@ -8626,6 +8715,13 @@
                 <a:cs typeface="Courier New" panose="02070309020205020404" pitchFamily="49" charset="0"/>
               </a:rPr>
               <a:t>cinema</a:t>
+            </a:r>
+            <a:r>
+              <a:rPr lang="pl-PL" b="0" dirty="0">
+                <a:latin typeface="Courier New" panose="02070309020205020404" pitchFamily="49" charset="0"/>
+                <a:cs typeface="Courier New" panose="02070309020205020404" pitchFamily="49" charset="0"/>
+              </a:rPr>
+              <a:t/>
             </a:r>
             <a:br>
               <a:rPr lang="pl-PL" b="0" dirty="0">
@@ -10223,7 +10319,7 @@
                 <a14:useLocalDpi xmlns:a14="http://schemas.microsoft.com/office/drawing/2010/main" val="0"/>
               </a:ext>
               <a:ext uri="{837473B0-CC2E-450A-ABE3-18F120FF3D39}">
-                <a1611:picAttrSrcUrl xmlns:a1611="http://schemas.microsoft.com/office/drawing/2016/11/main" r:id="rId4"/>
+                <a1611:picAttrSrcUrl xmlns:a1611="http://schemas.microsoft.com/office/drawing/2016/11/main" xmlns="" r:id="rId4"/>
               </a:ext>
             </a:extLst>
           </a:blip>
@@ -10423,7 +10519,7 @@
                 <a14:useLocalDpi xmlns:a14="http://schemas.microsoft.com/office/drawing/2010/main" val="0"/>
               </a:ext>
               <a:ext uri="{837473B0-CC2E-450A-ABE3-18F120FF3D39}">
-                <a1611:picAttrSrcUrl xmlns:a1611="http://schemas.microsoft.com/office/drawing/2016/11/main" r:id="rId3"/>
+                <a1611:picAttrSrcUrl xmlns:a1611="http://schemas.microsoft.com/office/drawing/2016/11/main" xmlns="" r:id="rId3"/>
               </a:ext>
             </a:extLst>
           </a:blip>
@@ -10455,13 +10551,13 @@
           </p:nvPr>
         </p:nvPicPr>
         <p:blipFill>
-          <a:blip r:embed="rId4">
+          <a:blip r:embed="rId4" cstate="hqprint">
             <a:extLst>
               <a:ext uri="{28A0092B-C50C-407E-A947-70E740481C1C}">
                 <a14:useLocalDpi xmlns:a14="http://schemas.microsoft.com/office/drawing/2010/main" val="0"/>
               </a:ext>
               <a:ext uri="{96DAC541-7B7A-43D3-8B79-37D633B846F1}">
-                <asvg:svgBlip xmlns:asvg="http://schemas.microsoft.com/office/drawing/2016/SVG/main" r:embed="rId5"/>
+                <asvg:svgBlip xmlns:asvg="http://schemas.microsoft.com/office/drawing/2016/SVG/main" xmlns="" r:embed="rId5"/>
               </a:ext>
             </a:extLst>
           </a:blip>
@@ -10628,7 +10724,7 @@
                 <a14:useLocalDpi xmlns:a14="http://schemas.microsoft.com/office/drawing/2010/main" val="0"/>
               </a:ext>
               <a:ext uri="{837473B0-CC2E-450A-ABE3-18F120FF3D39}">
-                <a1611:picAttrSrcUrl xmlns:a1611="http://schemas.microsoft.com/office/drawing/2016/11/main" r:id="rId3"/>
+                <a1611:picAttrSrcUrl xmlns:a1611="http://schemas.microsoft.com/office/drawing/2016/11/main" xmlns="" r:id="rId3"/>
               </a:ext>
             </a:extLst>
           </a:blip>
@@ -10712,13 +10808,13 @@
           <p:nvPr/>
         </p:nvPicPr>
         <p:blipFill>
-          <a:blip r:embed="rId4">
+          <a:blip r:embed="rId4" cstate="hqprint">
             <a:extLst>
               <a:ext uri="{28A0092B-C50C-407E-A947-70E740481C1C}">
                 <a14:useLocalDpi xmlns:a14="http://schemas.microsoft.com/office/drawing/2010/main" val="0"/>
               </a:ext>
               <a:ext uri="{96DAC541-7B7A-43D3-8B79-37D633B846F1}">
-                <asvg:svgBlip xmlns:asvg="http://schemas.microsoft.com/office/drawing/2016/SVG/main" r:embed="rId5"/>
+                <asvg:svgBlip xmlns:asvg="http://schemas.microsoft.com/office/drawing/2016/SVG/main" xmlns="" r:embed="rId5"/>
               </a:ext>
             </a:extLst>
           </a:blip>
@@ -10826,7 +10922,7 @@
                 <a14:useLocalDpi xmlns:a14="http://schemas.microsoft.com/office/drawing/2010/main" val="0"/>
               </a:ext>
               <a:ext uri="{837473B0-CC2E-450A-ABE3-18F120FF3D39}">
-                <a1611:picAttrSrcUrl xmlns:a1611="http://schemas.microsoft.com/office/drawing/2016/11/main" r:id="rId3"/>
+                <a1611:picAttrSrcUrl xmlns:a1611="http://schemas.microsoft.com/office/drawing/2016/11/main" xmlns="" r:id="rId3"/>
               </a:ext>
             </a:extLst>
           </a:blip>
@@ -10956,6 +11052,10 @@
               <a:rPr lang="en-US" b="0" dirty="0"/>
               <a:t>&lt;!-- development version, includes helpful console warnings --&gt; </a:t>
             </a:r>
+            <a:r>
+              <a:rPr lang="en-US" dirty="0"/>
+              <a:t/>
+            </a:r>
             <a:br>
               <a:rPr lang="en-US" dirty="0"/>
             </a:br>
@@ -10987,6 +11087,10 @@
             <a:r>
               <a:rPr lang="en-US" b="0" dirty="0"/>
               <a:t>&lt;!-- production version, optimized for size and speed --&gt; </a:t>
+            </a:r>
+            <a:r>
+              <a:rPr lang="en-US" dirty="0"/>
+              <a:t/>
             </a:r>
             <a:br>
               <a:rPr lang="en-US" dirty="0"/>
@@ -11432,12 +11536,26 @@
                 <a:cs typeface="Courier New" panose="02070309020205020404" pitchFamily="49" charset="0"/>
               </a:rPr>
             </a:br>
+            <a:r>
+              <a:rPr lang="pl-PL" b="0" dirty="0">
+                <a:latin typeface="Courier New" panose="02070309020205020404" pitchFamily="49" charset="0"/>
+                <a:cs typeface="Courier New" panose="02070309020205020404" pitchFamily="49" charset="0"/>
+              </a:rPr>
+              <a:t/>
+            </a:r>
             <a:br>
               <a:rPr lang="pl-PL" b="0" dirty="0">
                 <a:latin typeface="Courier New" panose="02070309020205020404" pitchFamily="49" charset="0"/>
                 <a:cs typeface="Courier New" panose="02070309020205020404" pitchFamily="49" charset="0"/>
               </a:rPr>
             </a:br>
+            <a:r>
+              <a:rPr lang="pl-PL" b="0" dirty="0">
+                <a:latin typeface="Courier New" panose="02070309020205020404" pitchFamily="49" charset="0"/>
+                <a:cs typeface="Courier New" panose="02070309020205020404" pitchFamily="49" charset="0"/>
+              </a:rPr>
+              <a:t/>
+            </a:r>
             <a:br>
               <a:rPr lang="pl-PL" b="0" dirty="0">
                 <a:latin typeface="Courier New" panose="02070309020205020404" pitchFamily="49" charset="0"/>
@@ -11531,12 +11649,26 @@
                 <a:cs typeface="Courier New" panose="02070309020205020404" pitchFamily="49" charset="0"/>
               </a:rPr>
             </a:br>
+            <a:r>
+              <a:rPr lang="pl-PL" b="0" dirty="0">
+                <a:latin typeface="Courier New" panose="02070309020205020404" pitchFamily="49" charset="0"/>
+                <a:cs typeface="Courier New" panose="02070309020205020404" pitchFamily="49" charset="0"/>
+              </a:rPr>
+              <a:t/>
+            </a:r>
             <a:br>
               <a:rPr lang="pl-PL" b="0" dirty="0">
                 <a:latin typeface="Courier New" panose="02070309020205020404" pitchFamily="49" charset="0"/>
                 <a:cs typeface="Courier New" panose="02070309020205020404" pitchFamily="49" charset="0"/>
               </a:rPr>
             </a:br>
+            <a:r>
+              <a:rPr lang="pl-PL" b="0" dirty="0">
+                <a:latin typeface="Courier New" panose="02070309020205020404" pitchFamily="49" charset="0"/>
+                <a:cs typeface="Courier New" panose="02070309020205020404" pitchFamily="49" charset="0"/>
+              </a:rPr>
+              <a:t/>
+            </a:r>
             <a:br>
               <a:rPr lang="pl-PL" b="0" dirty="0">
                 <a:latin typeface="Courier New" panose="02070309020205020404" pitchFamily="49" charset="0"/>

</xml_diff>